<commit_message>
added exception to FillChart
</commit_message>
<xml_diff>
--- a/TestSlideAssembler/verificationfiles/Template.pptx
+++ b/TestSlideAssembler/verificationfiles/Template.pptx
@@ -4,9 +4,13 @@
   <p:sldMasterIdLst>
     <p:sldMasterId id="2147483648" r:id="rId1"/>
   </p:sldMasterIdLst>
+  <p:notesMasterIdLst>
+    <p:notesMasterId r:id="rId5"/>
+  </p:notesMasterIdLst>
   <p:sldIdLst>
     <p:sldId id="257" r:id="rId2"/>
     <p:sldId id="260" r:id="rId3"/>
+    <p:sldId id="261" r:id="rId4"/>
   </p:sldIdLst>
   <p:sldSz cx="12192000" cy="6858000"/>
   <p:notesSz cx="6858000" cy="9144000"/>
@@ -189,22 +193,21 @@
           </c:spPr>
           <c:invertIfNegative val="0"/>
           <c:cat>
-            <c:numRef>
+            <c:strRef>
               <c:f>Tabelle1!$A$2:$A$4</c:f>
-              <c:numCache>
-                <c:formatCode>General</c:formatCode>
+              <c:strCache>
                 <c:ptCount val="3"/>
                 <c:pt idx="0">
-                  <c:v>1</c:v>
+                  <c:v>Messwert1</c:v>
                 </c:pt>
                 <c:pt idx="1">
-                  <c:v>2</c:v>
+                  <c:v>Messwert2</c:v>
                 </c:pt>
                 <c:pt idx="2">
-                  <c:v>3</c:v>
+                  <c:v>Messwert3</c:v>
                 </c:pt>
-              </c:numCache>
-            </c:numRef>
+              </c:strCache>
+            </c:strRef>
           </c:cat>
           <c:val>
             <c:numRef>
@@ -423,7 +426,463 @@
 </c:chartSpace>
 </file>
 
+<file path=ppt/charts/chart2.xml><?xml version="1.0" encoding="utf-8"?>
+<c:chartSpace xmlns:c="http://schemas.openxmlformats.org/drawingml/2006/chart" xmlns:a="http://schemas.openxmlformats.org/drawingml/2006/main" xmlns:r="http://schemas.openxmlformats.org/officeDocument/2006/relationships" xmlns:c16r2="http://schemas.microsoft.com/office/drawing/2015/06/chart">
+  <c:date1904 val="0"/>
+  <c:lang val="de-DE"/>
+  <c:roundedCorners val="0"/>
+  <mc:AlternateContent xmlns:mc="http://schemas.openxmlformats.org/markup-compatibility/2006">
+    <mc:Choice xmlns:c14="http://schemas.microsoft.com/office/drawing/2007/8/2/chart" Requires="c14">
+      <c14:style val="102"/>
+    </mc:Choice>
+    <mc:Fallback>
+      <c:style val="2"/>
+    </mc:Fallback>
+  </mc:AlternateContent>
+  <c:chart>
+    <c:title>
+      <c:tx>
+        <c:rich>
+          <a:bodyPr rot="0" spcFirstLastPara="1" vertOverflow="ellipsis" vert="horz" wrap="square" anchor="ctr" anchorCtr="1"/>
+          <a:lstStyle/>
+          <a:p>
+            <a:pPr>
+              <a:defRPr sz="1862" b="0" i="0" u="none" strike="noStrike" kern="1200" spc="0" baseline="0">
+                <a:solidFill>
+                  <a:schemeClr val="tx1">
+                    <a:lumMod val="65000"/>
+                    <a:lumOff val="35000"/>
+                  </a:schemeClr>
+                </a:solidFill>
+                <a:latin typeface="+mn-lt"/>
+                <a:ea typeface="+mn-ea"/>
+                <a:cs typeface="+mn-cs"/>
+              </a:defRPr>
+            </a:pPr>
+            <a:r>
+              <a:rPr lang="de-DE" dirty="0" err="1"/>
+              <a:t>LineChart</a:t>
+            </a:r>
+            <a:endParaRPr lang="de-DE" baseline="0" dirty="0"/>
+          </a:p>
+        </c:rich>
+      </c:tx>
+      <c:overlay val="0"/>
+      <c:spPr>
+        <a:noFill/>
+        <a:ln>
+          <a:noFill/>
+        </a:ln>
+        <a:effectLst/>
+      </c:spPr>
+      <c:txPr>
+        <a:bodyPr rot="0" spcFirstLastPara="1" vertOverflow="ellipsis" vert="horz" wrap="square" anchor="ctr" anchorCtr="1"/>
+        <a:lstStyle/>
+        <a:p>
+          <a:pPr>
+            <a:defRPr sz="1862" b="0" i="0" u="none" strike="noStrike" kern="1200" spc="0" baseline="0">
+              <a:solidFill>
+                <a:schemeClr val="tx1">
+                  <a:lumMod val="65000"/>
+                  <a:lumOff val="35000"/>
+                </a:schemeClr>
+              </a:solidFill>
+              <a:latin typeface="+mn-lt"/>
+              <a:ea typeface="+mn-ea"/>
+              <a:cs typeface="+mn-cs"/>
+            </a:defRPr>
+          </a:pPr>
+          <a:endParaRPr lang="de-DE"/>
+        </a:p>
+      </c:txPr>
+    </c:title>
+    <c:autoTitleDeleted val="0"/>
+    <c:plotArea>
+      <c:layout/>
+      <c:lineChart>
+        <c:grouping val="standard"/>
+        <c:varyColors val="0"/>
+        <c:ser>
+          <c:idx val="0"/>
+          <c:order val="0"/>
+          <c:tx>
+            <c:strRef>
+              <c:f>Tabelle1!$B$1</c:f>
+              <c:strCache>
+                <c:ptCount val="1"/>
+                <c:pt idx="0">
+                  <c:v>Datenreihe 1</c:v>
+                </c:pt>
+              </c:strCache>
+            </c:strRef>
+          </c:tx>
+          <c:spPr>
+            <a:ln w="28575" cap="rnd">
+              <a:solidFill>
+                <a:schemeClr val="accent1"/>
+              </a:solidFill>
+              <a:round/>
+            </a:ln>
+            <a:effectLst/>
+          </c:spPr>
+          <c:marker>
+            <c:symbol val="none"/>
+          </c:marker>
+          <c:cat>
+            <c:strRef>
+              <c:f>Tabelle1!$A$2:$A$5</c:f>
+              <c:strCache>
+                <c:ptCount val="4"/>
+                <c:pt idx="0">
+                  <c:v>Kategorie 1</c:v>
+                </c:pt>
+                <c:pt idx="1">
+                  <c:v>Kategorie 2</c:v>
+                </c:pt>
+                <c:pt idx="2">
+                  <c:v>Kategorie 3</c:v>
+                </c:pt>
+                <c:pt idx="3">
+                  <c:v>Kategorie 4</c:v>
+                </c:pt>
+              </c:strCache>
+            </c:strRef>
+          </c:cat>
+          <c:val>
+            <c:numRef>
+              <c:f>Tabelle1!$B$2:$B$5</c:f>
+              <c:numCache>
+                <c:formatCode>General</c:formatCode>
+                <c:ptCount val="4"/>
+                <c:pt idx="0">
+                  <c:v>4.3</c:v>
+                </c:pt>
+                <c:pt idx="1">
+                  <c:v>2.5</c:v>
+                </c:pt>
+                <c:pt idx="2">
+                  <c:v>3.5</c:v>
+                </c:pt>
+                <c:pt idx="3">
+                  <c:v>4.5</c:v>
+                </c:pt>
+              </c:numCache>
+            </c:numRef>
+          </c:val>
+          <c:smooth val="0"/>
+          <c:extLst>
+            <c:ext xmlns:c16="http://schemas.microsoft.com/office/drawing/2014/chart" uri="{C3380CC4-5D6E-409C-BE32-E72D297353CC}">
+              <c16:uniqueId val="{00000000-F14A-4150-90B4-D63677A98F16}"/>
+            </c:ext>
+          </c:extLst>
+        </c:ser>
+        <c:ser>
+          <c:idx val="1"/>
+          <c:order val="1"/>
+          <c:tx>
+            <c:strRef>
+              <c:f>Tabelle1!$C$1</c:f>
+              <c:strCache>
+                <c:ptCount val="1"/>
+                <c:pt idx="0">
+                  <c:v>Datenreihe 2</c:v>
+                </c:pt>
+              </c:strCache>
+            </c:strRef>
+          </c:tx>
+          <c:spPr>
+            <a:ln w="28575" cap="rnd">
+              <a:solidFill>
+                <a:schemeClr val="accent2"/>
+              </a:solidFill>
+              <a:round/>
+            </a:ln>
+            <a:effectLst/>
+          </c:spPr>
+          <c:marker>
+            <c:symbol val="none"/>
+          </c:marker>
+          <c:cat>
+            <c:strRef>
+              <c:f>Tabelle1!$A$2:$A$5</c:f>
+              <c:strCache>
+                <c:ptCount val="4"/>
+                <c:pt idx="0">
+                  <c:v>Kategorie 1</c:v>
+                </c:pt>
+                <c:pt idx="1">
+                  <c:v>Kategorie 2</c:v>
+                </c:pt>
+                <c:pt idx="2">
+                  <c:v>Kategorie 3</c:v>
+                </c:pt>
+                <c:pt idx="3">
+                  <c:v>Kategorie 4</c:v>
+                </c:pt>
+              </c:strCache>
+            </c:strRef>
+          </c:cat>
+          <c:val>
+            <c:numRef>
+              <c:f>Tabelle1!$C$2:$C$5</c:f>
+              <c:numCache>
+                <c:formatCode>General</c:formatCode>
+                <c:ptCount val="4"/>
+                <c:pt idx="0">
+                  <c:v>2.4</c:v>
+                </c:pt>
+                <c:pt idx="1">
+                  <c:v>4.4000000000000004</c:v>
+                </c:pt>
+                <c:pt idx="2">
+                  <c:v>1.8</c:v>
+                </c:pt>
+                <c:pt idx="3">
+                  <c:v>2.8</c:v>
+                </c:pt>
+              </c:numCache>
+            </c:numRef>
+          </c:val>
+          <c:smooth val="0"/>
+          <c:extLst>
+            <c:ext xmlns:c16="http://schemas.microsoft.com/office/drawing/2014/chart" uri="{C3380CC4-5D6E-409C-BE32-E72D297353CC}">
+              <c16:uniqueId val="{00000001-F14A-4150-90B4-D63677A98F16}"/>
+            </c:ext>
+          </c:extLst>
+        </c:ser>
+        <c:dLbls>
+          <c:showLegendKey val="0"/>
+          <c:showVal val="0"/>
+          <c:showCatName val="0"/>
+          <c:showSerName val="0"/>
+          <c:showPercent val="0"/>
+          <c:showBubbleSize val="0"/>
+        </c:dLbls>
+        <c:smooth val="0"/>
+        <c:axId val="894060176"/>
+        <c:axId val="894059216"/>
+      </c:lineChart>
+      <c:catAx>
+        <c:axId val="894060176"/>
+        <c:scaling>
+          <c:orientation val="minMax"/>
+        </c:scaling>
+        <c:delete val="0"/>
+        <c:axPos val="b"/>
+        <c:numFmt formatCode="General" sourceLinked="1"/>
+        <c:majorTickMark val="none"/>
+        <c:minorTickMark val="none"/>
+        <c:tickLblPos val="nextTo"/>
+        <c:spPr>
+          <a:noFill/>
+          <a:ln w="9525" cap="flat" cmpd="sng" algn="ctr">
+            <a:solidFill>
+              <a:schemeClr val="tx1">
+                <a:lumMod val="15000"/>
+                <a:lumOff val="85000"/>
+              </a:schemeClr>
+            </a:solidFill>
+            <a:round/>
+          </a:ln>
+          <a:effectLst/>
+        </c:spPr>
+        <c:txPr>
+          <a:bodyPr rot="-60000000" spcFirstLastPara="1" vertOverflow="ellipsis" vert="horz" wrap="square" anchor="ctr" anchorCtr="1"/>
+          <a:lstStyle/>
+          <a:p>
+            <a:pPr>
+              <a:defRPr sz="1197" b="0" i="0" u="none" strike="noStrike" kern="1200" baseline="0">
+                <a:solidFill>
+                  <a:schemeClr val="tx1">
+                    <a:lumMod val="65000"/>
+                    <a:lumOff val="35000"/>
+                  </a:schemeClr>
+                </a:solidFill>
+                <a:latin typeface="+mn-lt"/>
+                <a:ea typeface="+mn-ea"/>
+                <a:cs typeface="+mn-cs"/>
+              </a:defRPr>
+            </a:pPr>
+            <a:endParaRPr lang="de-DE"/>
+          </a:p>
+        </c:txPr>
+        <c:crossAx val="894059216"/>
+        <c:crosses val="autoZero"/>
+        <c:auto val="1"/>
+        <c:lblAlgn val="ctr"/>
+        <c:lblOffset val="100"/>
+        <c:noMultiLvlLbl val="0"/>
+      </c:catAx>
+      <c:valAx>
+        <c:axId val="894059216"/>
+        <c:scaling>
+          <c:orientation val="minMax"/>
+        </c:scaling>
+        <c:delete val="0"/>
+        <c:axPos val="l"/>
+        <c:majorGridlines>
+          <c:spPr>
+            <a:ln w="9525" cap="flat" cmpd="sng" algn="ctr">
+              <a:solidFill>
+                <a:schemeClr val="tx1">
+                  <a:lumMod val="15000"/>
+                  <a:lumOff val="85000"/>
+                </a:schemeClr>
+              </a:solidFill>
+              <a:round/>
+            </a:ln>
+            <a:effectLst/>
+          </c:spPr>
+        </c:majorGridlines>
+        <c:numFmt formatCode="General" sourceLinked="1"/>
+        <c:majorTickMark val="none"/>
+        <c:minorTickMark val="none"/>
+        <c:tickLblPos val="nextTo"/>
+        <c:spPr>
+          <a:noFill/>
+          <a:ln>
+            <a:noFill/>
+          </a:ln>
+          <a:effectLst/>
+        </c:spPr>
+        <c:txPr>
+          <a:bodyPr rot="-60000000" spcFirstLastPara="1" vertOverflow="ellipsis" vert="horz" wrap="square" anchor="ctr" anchorCtr="1"/>
+          <a:lstStyle/>
+          <a:p>
+            <a:pPr>
+              <a:defRPr sz="1197" b="0" i="0" u="none" strike="noStrike" kern="1200" baseline="0">
+                <a:solidFill>
+                  <a:schemeClr val="tx1">
+                    <a:lumMod val="65000"/>
+                    <a:lumOff val="35000"/>
+                  </a:schemeClr>
+                </a:solidFill>
+                <a:latin typeface="+mn-lt"/>
+                <a:ea typeface="+mn-ea"/>
+                <a:cs typeface="+mn-cs"/>
+              </a:defRPr>
+            </a:pPr>
+            <a:endParaRPr lang="de-DE"/>
+          </a:p>
+        </c:txPr>
+        <c:crossAx val="894060176"/>
+        <c:crosses val="autoZero"/>
+        <c:crossBetween val="between"/>
+      </c:valAx>
+      <c:spPr>
+        <a:noFill/>
+        <a:ln>
+          <a:noFill/>
+        </a:ln>
+        <a:effectLst/>
+      </c:spPr>
+    </c:plotArea>
+    <c:legend>
+      <c:legendPos val="b"/>
+      <c:overlay val="0"/>
+      <c:spPr>
+        <a:noFill/>
+        <a:ln>
+          <a:noFill/>
+        </a:ln>
+        <a:effectLst/>
+      </c:spPr>
+      <c:txPr>
+        <a:bodyPr rot="0" spcFirstLastPara="1" vertOverflow="ellipsis" vert="horz" wrap="square" anchor="ctr" anchorCtr="1"/>
+        <a:lstStyle/>
+        <a:p>
+          <a:pPr>
+            <a:defRPr sz="1197" b="0" i="0" u="none" strike="noStrike" kern="1200" baseline="0">
+              <a:solidFill>
+                <a:schemeClr val="tx1">
+                  <a:lumMod val="65000"/>
+                  <a:lumOff val="35000"/>
+                </a:schemeClr>
+              </a:solidFill>
+              <a:latin typeface="+mn-lt"/>
+              <a:ea typeface="+mn-ea"/>
+              <a:cs typeface="+mn-cs"/>
+            </a:defRPr>
+          </a:pPr>
+          <a:endParaRPr lang="de-DE"/>
+        </a:p>
+      </c:txPr>
+    </c:legend>
+    <c:plotVisOnly val="1"/>
+    <c:dispBlanksAs val="gap"/>
+    <c:extLst>
+      <c:ext xmlns:c16r3="http://schemas.microsoft.com/office/drawing/2017/03/chart" uri="{56B9EC1D-385E-4148-901F-78D8002777C0}">
+        <c16r3:dataDisplayOptions16>
+          <c16r3:dispNaAsBlank val="1"/>
+        </c16r3:dataDisplayOptions16>
+      </c:ext>
+    </c:extLst>
+    <c:showDLblsOverMax val="0"/>
+  </c:chart>
+  <c:spPr>
+    <a:noFill/>
+    <a:ln>
+      <a:noFill/>
+    </a:ln>
+    <a:effectLst/>
+  </c:spPr>
+  <c:txPr>
+    <a:bodyPr/>
+    <a:lstStyle/>
+    <a:p>
+      <a:pPr>
+        <a:defRPr/>
+      </a:pPr>
+      <a:endParaRPr lang="de-DE"/>
+    </a:p>
+  </c:txPr>
+  <c:externalData r:id="rId3">
+    <c:autoUpdate val="0"/>
+  </c:externalData>
+</c:chartSpace>
+</file>
+
 <file path=ppt/charts/colors1.xml><?xml version="1.0" encoding="utf-8"?>
+<cs:colorStyle xmlns:cs="http://schemas.microsoft.com/office/drawing/2012/chartStyle" xmlns:a="http://schemas.openxmlformats.org/drawingml/2006/main" meth="cycle" id="10">
+  <a:schemeClr val="accent1"/>
+  <a:schemeClr val="accent2"/>
+  <a:schemeClr val="accent3"/>
+  <a:schemeClr val="accent4"/>
+  <a:schemeClr val="accent5"/>
+  <a:schemeClr val="accent6"/>
+  <cs:variation/>
+  <cs:variation>
+    <a:lumMod val="60000"/>
+  </cs:variation>
+  <cs:variation>
+    <a:lumMod val="80000"/>
+    <a:lumOff val="20000"/>
+  </cs:variation>
+  <cs:variation>
+    <a:lumMod val="80000"/>
+  </cs:variation>
+  <cs:variation>
+    <a:lumMod val="60000"/>
+    <a:lumOff val="40000"/>
+  </cs:variation>
+  <cs:variation>
+    <a:lumMod val="50000"/>
+  </cs:variation>
+  <cs:variation>
+    <a:lumMod val="70000"/>
+    <a:lumOff val="30000"/>
+  </cs:variation>
+  <cs:variation>
+    <a:lumMod val="70000"/>
+  </cs:variation>
+  <cs:variation>
+    <a:lumMod val="50000"/>
+    <a:lumOff val="50000"/>
+  </cs:variation>
+</cs:colorStyle>
+</file>
+
+<file path=ppt/charts/colors2.xml><?xml version="1.0" encoding="utf-8"?>
 <cs:colorStyle xmlns:cs="http://schemas.microsoft.com/office/drawing/2012/chartStyle" xmlns:a="http://schemas.openxmlformats.org/drawingml/2006/main" meth="cycle" id="10">
   <a:schemeClr val="accent1"/>
   <a:schemeClr val="accent2"/>
@@ -966,6 +1425,955 @@
 </cs:chartStyle>
 </file>
 
+<file path=ppt/charts/style2.xml><?xml version="1.0" encoding="utf-8"?>
+<cs:chartStyle xmlns:cs="http://schemas.microsoft.com/office/drawing/2012/chartStyle" xmlns:a="http://schemas.openxmlformats.org/drawingml/2006/main" id="227">
+  <cs:axisTitle>
+    <cs:lnRef idx="0"/>
+    <cs:fillRef idx="0"/>
+    <cs:effectRef idx="0"/>
+    <cs:fontRef idx="minor">
+      <a:schemeClr val="tx1">
+        <a:lumMod val="65000"/>
+        <a:lumOff val="35000"/>
+      </a:schemeClr>
+    </cs:fontRef>
+    <cs:defRPr sz="1330" kern="1200"/>
+  </cs:axisTitle>
+  <cs:categoryAxis>
+    <cs:lnRef idx="0"/>
+    <cs:fillRef idx="0"/>
+    <cs:effectRef idx="0"/>
+    <cs:fontRef idx="minor">
+      <a:schemeClr val="tx1">
+        <a:lumMod val="65000"/>
+        <a:lumOff val="35000"/>
+      </a:schemeClr>
+    </cs:fontRef>
+    <cs:spPr>
+      <a:ln w="9525" cap="flat" cmpd="sng" algn="ctr">
+        <a:solidFill>
+          <a:schemeClr val="tx1">
+            <a:lumMod val="15000"/>
+            <a:lumOff val="85000"/>
+          </a:schemeClr>
+        </a:solidFill>
+        <a:round/>
+      </a:ln>
+    </cs:spPr>
+    <cs:defRPr sz="1197" kern="1200"/>
+  </cs:categoryAxis>
+  <cs:chartArea mods="allowNoFillOverride allowNoLineOverride">
+    <cs:lnRef idx="0"/>
+    <cs:fillRef idx="0"/>
+    <cs:effectRef idx="0"/>
+    <cs:fontRef idx="minor">
+      <a:schemeClr val="tx1"/>
+    </cs:fontRef>
+    <cs:spPr>
+      <a:solidFill>
+        <a:schemeClr val="bg1"/>
+      </a:solidFill>
+      <a:ln w="9525" cap="flat" cmpd="sng" algn="ctr">
+        <a:solidFill>
+          <a:schemeClr val="tx1">
+            <a:lumMod val="15000"/>
+            <a:lumOff val="85000"/>
+          </a:schemeClr>
+        </a:solidFill>
+        <a:round/>
+      </a:ln>
+    </cs:spPr>
+    <cs:defRPr sz="1330" kern="1200"/>
+  </cs:chartArea>
+  <cs:dataLabel>
+    <cs:lnRef idx="0"/>
+    <cs:fillRef idx="0"/>
+    <cs:effectRef idx="0"/>
+    <cs:fontRef idx="minor">
+      <a:schemeClr val="tx1">
+        <a:lumMod val="75000"/>
+        <a:lumOff val="25000"/>
+      </a:schemeClr>
+    </cs:fontRef>
+    <cs:defRPr sz="1197" kern="1200"/>
+  </cs:dataLabel>
+  <cs:dataLabelCallout>
+    <cs:lnRef idx="0"/>
+    <cs:fillRef idx="0"/>
+    <cs:effectRef idx="0"/>
+    <cs:fontRef idx="minor">
+      <a:schemeClr val="dk1">
+        <a:lumMod val="65000"/>
+        <a:lumOff val="35000"/>
+      </a:schemeClr>
+    </cs:fontRef>
+    <cs:spPr>
+      <a:solidFill>
+        <a:schemeClr val="lt1"/>
+      </a:solidFill>
+      <a:ln>
+        <a:solidFill>
+          <a:schemeClr val="dk1">
+            <a:lumMod val="25000"/>
+            <a:lumOff val="75000"/>
+          </a:schemeClr>
+        </a:solidFill>
+      </a:ln>
+    </cs:spPr>
+    <cs:defRPr sz="1197" kern="1200"/>
+    <cs:bodyPr rot="0" spcFirstLastPara="1" vertOverflow="clip" horzOverflow="clip" vert="horz" wrap="square" lIns="36576" tIns="18288" rIns="36576" bIns="18288" anchor="ctr" anchorCtr="1">
+      <a:spAutoFit/>
+    </cs:bodyPr>
+  </cs:dataLabelCallout>
+  <cs:dataPoint>
+    <cs:lnRef idx="0"/>
+    <cs:fillRef idx="1">
+      <cs:styleClr val="auto"/>
+    </cs:fillRef>
+    <cs:effectRef idx="0"/>
+    <cs:fontRef idx="minor">
+      <a:schemeClr val="tx1"/>
+    </cs:fontRef>
+    <cs:spPr>
+      <a:solidFill>
+        <a:schemeClr val="phClr"/>
+      </a:solidFill>
+    </cs:spPr>
+  </cs:dataPoint>
+  <cs:dataPoint3D>
+    <cs:lnRef idx="0"/>
+    <cs:fillRef idx="1">
+      <cs:styleClr val="auto"/>
+    </cs:fillRef>
+    <cs:effectRef idx="0"/>
+    <cs:fontRef idx="minor">
+      <a:schemeClr val="tx1"/>
+    </cs:fontRef>
+    <cs:spPr>
+      <a:solidFill>
+        <a:schemeClr val="phClr"/>
+      </a:solidFill>
+    </cs:spPr>
+  </cs:dataPoint3D>
+  <cs:dataPointLine>
+    <cs:lnRef idx="0">
+      <cs:styleClr val="auto"/>
+    </cs:lnRef>
+    <cs:fillRef idx="1"/>
+    <cs:effectRef idx="0"/>
+    <cs:fontRef idx="minor">
+      <a:schemeClr val="tx1"/>
+    </cs:fontRef>
+    <cs:spPr>
+      <a:ln w="28575" cap="rnd">
+        <a:solidFill>
+          <a:schemeClr val="phClr"/>
+        </a:solidFill>
+        <a:round/>
+      </a:ln>
+    </cs:spPr>
+  </cs:dataPointLine>
+  <cs:dataPointMarker>
+    <cs:lnRef idx="0">
+      <cs:styleClr val="auto"/>
+    </cs:lnRef>
+    <cs:fillRef idx="1">
+      <cs:styleClr val="auto"/>
+    </cs:fillRef>
+    <cs:effectRef idx="0"/>
+    <cs:fontRef idx="minor">
+      <a:schemeClr val="tx1"/>
+    </cs:fontRef>
+    <cs:spPr>
+      <a:solidFill>
+        <a:schemeClr val="phClr"/>
+      </a:solidFill>
+      <a:ln w="9525">
+        <a:solidFill>
+          <a:schemeClr val="phClr"/>
+        </a:solidFill>
+      </a:ln>
+    </cs:spPr>
+  </cs:dataPointMarker>
+  <cs:dataPointMarkerLayout symbol="circle" size="5"/>
+  <cs:dataPointWireframe>
+    <cs:lnRef idx="0">
+      <cs:styleClr val="auto"/>
+    </cs:lnRef>
+    <cs:fillRef idx="1"/>
+    <cs:effectRef idx="0"/>
+    <cs:fontRef idx="minor">
+      <a:schemeClr val="tx1"/>
+    </cs:fontRef>
+    <cs:spPr>
+      <a:ln w="9525" cap="rnd">
+        <a:solidFill>
+          <a:schemeClr val="phClr"/>
+        </a:solidFill>
+        <a:round/>
+      </a:ln>
+    </cs:spPr>
+  </cs:dataPointWireframe>
+  <cs:dataTable>
+    <cs:lnRef idx="0"/>
+    <cs:fillRef idx="0"/>
+    <cs:effectRef idx="0"/>
+    <cs:fontRef idx="minor">
+      <a:schemeClr val="tx1">
+        <a:lumMod val="65000"/>
+        <a:lumOff val="35000"/>
+      </a:schemeClr>
+    </cs:fontRef>
+    <cs:spPr>
+      <a:noFill/>
+      <a:ln w="9525" cap="flat" cmpd="sng" algn="ctr">
+        <a:solidFill>
+          <a:schemeClr val="tx1">
+            <a:lumMod val="15000"/>
+            <a:lumOff val="85000"/>
+          </a:schemeClr>
+        </a:solidFill>
+        <a:round/>
+      </a:ln>
+    </cs:spPr>
+    <cs:defRPr sz="1197" kern="1200"/>
+  </cs:dataTable>
+  <cs:downBar>
+    <cs:lnRef idx="0"/>
+    <cs:fillRef idx="0"/>
+    <cs:effectRef idx="0"/>
+    <cs:fontRef idx="minor">
+      <a:schemeClr val="dk1"/>
+    </cs:fontRef>
+    <cs:spPr>
+      <a:solidFill>
+        <a:schemeClr val="dk1">
+          <a:lumMod val="65000"/>
+          <a:lumOff val="35000"/>
+        </a:schemeClr>
+      </a:solidFill>
+      <a:ln w="9525">
+        <a:solidFill>
+          <a:schemeClr val="tx1">
+            <a:lumMod val="65000"/>
+            <a:lumOff val="35000"/>
+          </a:schemeClr>
+        </a:solidFill>
+      </a:ln>
+    </cs:spPr>
+  </cs:downBar>
+  <cs:dropLine>
+    <cs:lnRef idx="0"/>
+    <cs:fillRef idx="0"/>
+    <cs:effectRef idx="0"/>
+    <cs:fontRef idx="minor">
+      <a:schemeClr val="tx1"/>
+    </cs:fontRef>
+    <cs:spPr>
+      <a:ln w="9525" cap="flat" cmpd="sng" algn="ctr">
+        <a:solidFill>
+          <a:schemeClr val="tx1">
+            <a:lumMod val="35000"/>
+            <a:lumOff val="65000"/>
+          </a:schemeClr>
+        </a:solidFill>
+        <a:round/>
+      </a:ln>
+    </cs:spPr>
+  </cs:dropLine>
+  <cs:errorBar>
+    <cs:lnRef idx="0"/>
+    <cs:fillRef idx="0"/>
+    <cs:effectRef idx="0"/>
+    <cs:fontRef idx="minor">
+      <a:schemeClr val="tx1"/>
+    </cs:fontRef>
+    <cs:spPr>
+      <a:ln w="9525" cap="flat" cmpd="sng" algn="ctr">
+        <a:solidFill>
+          <a:schemeClr val="tx1">
+            <a:lumMod val="65000"/>
+            <a:lumOff val="35000"/>
+          </a:schemeClr>
+        </a:solidFill>
+        <a:round/>
+      </a:ln>
+    </cs:spPr>
+  </cs:errorBar>
+  <cs:floor>
+    <cs:lnRef idx="0"/>
+    <cs:fillRef idx="0"/>
+    <cs:effectRef idx="0"/>
+    <cs:fontRef idx="minor">
+      <a:schemeClr val="tx1"/>
+    </cs:fontRef>
+    <cs:spPr>
+      <a:noFill/>
+      <a:ln>
+        <a:noFill/>
+      </a:ln>
+    </cs:spPr>
+  </cs:floor>
+  <cs:gridlineMajor>
+    <cs:lnRef idx="0"/>
+    <cs:fillRef idx="0"/>
+    <cs:effectRef idx="0"/>
+    <cs:fontRef idx="minor">
+      <a:schemeClr val="tx1"/>
+    </cs:fontRef>
+    <cs:spPr>
+      <a:ln w="9525" cap="flat" cmpd="sng" algn="ctr">
+        <a:solidFill>
+          <a:schemeClr val="tx1">
+            <a:lumMod val="15000"/>
+            <a:lumOff val="85000"/>
+          </a:schemeClr>
+        </a:solidFill>
+        <a:round/>
+      </a:ln>
+    </cs:spPr>
+  </cs:gridlineMajor>
+  <cs:gridlineMinor>
+    <cs:lnRef idx="0"/>
+    <cs:fillRef idx="0"/>
+    <cs:effectRef idx="0"/>
+    <cs:fontRef idx="minor">
+      <a:schemeClr val="tx1"/>
+    </cs:fontRef>
+    <cs:spPr>
+      <a:ln w="9525" cap="flat" cmpd="sng" algn="ctr">
+        <a:solidFill>
+          <a:schemeClr val="tx1">
+            <a:lumMod val="5000"/>
+            <a:lumOff val="95000"/>
+          </a:schemeClr>
+        </a:solidFill>
+        <a:round/>
+      </a:ln>
+    </cs:spPr>
+  </cs:gridlineMinor>
+  <cs:hiLoLine>
+    <cs:lnRef idx="0"/>
+    <cs:fillRef idx="0"/>
+    <cs:effectRef idx="0"/>
+    <cs:fontRef idx="minor">
+      <a:schemeClr val="tx1"/>
+    </cs:fontRef>
+    <cs:spPr>
+      <a:ln w="9525" cap="flat" cmpd="sng" algn="ctr">
+        <a:solidFill>
+          <a:schemeClr val="tx1">
+            <a:lumMod val="75000"/>
+            <a:lumOff val="25000"/>
+          </a:schemeClr>
+        </a:solidFill>
+        <a:round/>
+      </a:ln>
+    </cs:spPr>
+  </cs:hiLoLine>
+  <cs:leaderLine>
+    <cs:lnRef idx="0"/>
+    <cs:fillRef idx="0"/>
+    <cs:effectRef idx="0"/>
+    <cs:fontRef idx="minor">
+      <a:schemeClr val="tx1"/>
+    </cs:fontRef>
+    <cs:spPr>
+      <a:ln w="9525" cap="flat" cmpd="sng" algn="ctr">
+        <a:solidFill>
+          <a:schemeClr val="tx1">
+            <a:lumMod val="35000"/>
+            <a:lumOff val="65000"/>
+          </a:schemeClr>
+        </a:solidFill>
+        <a:round/>
+      </a:ln>
+    </cs:spPr>
+  </cs:leaderLine>
+  <cs:legend>
+    <cs:lnRef idx="0"/>
+    <cs:fillRef idx="0"/>
+    <cs:effectRef idx="0"/>
+    <cs:fontRef idx="minor">
+      <a:schemeClr val="tx1">
+        <a:lumMod val="65000"/>
+        <a:lumOff val="35000"/>
+      </a:schemeClr>
+    </cs:fontRef>
+    <cs:defRPr sz="1197" kern="1200"/>
+  </cs:legend>
+  <cs:plotArea mods="allowNoFillOverride allowNoLineOverride">
+    <cs:lnRef idx="0"/>
+    <cs:fillRef idx="0"/>
+    <cs:effectRef idx="0"/>
+    <cs:fontRef idx="minor">
+      <a:schemeClr val="tx1"/>
+    </cs:fontRef>
+  </cs:plotArea>
+  <cs:plotArea3D mods="allowNoFillOverride allowNoLineOverride">
+    <cs:lnRef idx="0"/>
+    <cs:fillRef idx="0"/>
+    <cs:effectRef idx="0"/>
+    <cs:fontRef idx="minor">
+      <a:schemeClr val="tx1"/>
+    </cs:fontRef>
+  </cs:plotArea3D>
+  <cs:seriesAxis>
+    <cs:lnRef idx="0"/>
+    <cs:fillRef idx="0"/>
+    <cs:effectRef idx="0"/>
+    <cs:fontRef idx="minor">
+      <a:schemeClr val="tx1">
+        <a:lumMod val="65000"/>
+        <a:lumOff val="35000"/>
+      </a:schemeClr>
+    </cs:fontRef>
+    <cs:defRPr sz="1197" kern="1200"/>
+  </cs:seriesAxis>
+  <cs:seriesLine>
+    <cs:lnRef idx="0"/>
+    <cs:fillRef idx="0"/>
+    <cs:effectRef idx="0"/>
+    <cs:fontRef idx="minor">
+      <a:schemeClr val="tx1"/>
+    </cs:fontRef>
+    <cs:spPr>
+      <a:ln w="9525" cap="flat" cmpd="sng" algn="ctr">
+        <a:solidFill>
+          <a:schemeClr val="tx1">
+            <a:lumMod val="35000"/>
+            <a:lumOff val="65000"/>
+          </a:schemeClr>
+        </a:solidFill>
+        <a:round/>
+      </a:ln>
+    </cs:spPr>
+  </cs:seriesLine>
+  <cs:title>
+    <cs:lnRef idx="0"/>
+    <cs:fillRef idx="0"/>
+    <cs:effectRef idx="0"/>
+    <cs:fontRef idx="minor">
+      <a:schemeClr val="tx1">
+        <a:lumMod val="65000"/>
+        <a:lumOff val="35000"/>
+      </a:schemeClr>
+    </cs:fontRef>
+    <cs:defRPr sz="1862" b="0" kern="1200" spc="0" baseline="0"/>
+  </cs:title>
+  <cs:trendline>
+    <cs:lnRef idx="0">
+      <cs:styleClr val="auto"/>
+    </cs:lnRef>
+    <cs:fillRef idx="0"/>
+    <cs:effectRef idx="0"/>
+    <cs:fontRef idx="minor">
+      <a:schemeClr val="tx1"/>
+    </cs:fontRef>
+    <cs:spPr>
+      <a:ln w="19050" cap="rnd">
+        <a:solidFill>
+          <a:schemeClr val="phClr"/>
+        </a:solidFill>
+        <a:prstDash val="sysDot"/>
+      </a:ln>
+    </cs:spPr>
+  </cs:trendline>
+  <cs:trendlineLabel>
+    <cs:lnRef idx="0"/>
+    <cs:fillRef idx="0"/>
+    <cs:effectRef idx="0"/>
+    <cs:fontRef idx="minor">
+      <a:schemeClr val="tx1">
+        <a:lumMod val="65000"/>
+        <a:lumOff val="35000"/>
+      </a:schemeClr>
+    </cs:fontRef>
+    <cs:defRPr sz="1197" kern="1200"/>
+  </cs:trendlineLabel>
+  <cs:upBar>
+    <cs:lnRef idx="0"/>
+    <cs:fillRef idx="0"/>
+    <cs:effectRef idx="0"/>
+    <cs:fontRef idx="minor">
+      <a:schemeClr val="dk1"/>
+    </cs:fontRef>
+    <cs:spPr>
+      <a:solidFill>
+        <a:schemeClr val="lt1"/>
+      </a:solidFill>
+      <a:ln w="9525">
+        <a:solidFill>
+          <a:schemeClr val="tx1">
+            <a:lumMod val="15000"/>
+            <a:lumOff val="85000"/>
+          </a:schemeClr>
+        </a:solidFill>
+      </a:ln>
+    </cs:spPr>
+  </cs:upBar>
+  <cs:valueAxis>
+    <cs:lnRef idx="0"/>
+    <cs:fillRef idx="0"/>
+    <cs:effectRef idx="0"/>
+    <cs:fontRef idx="minor">
+      <a:schemeClr val="tx1">
+        <a:lumMod val="65000"/>
+        <a:lumOff val="35000"/>
+      </a:schemeClr>
+    </cs:fontRef>
+    <cs:defRPr sz="1197" kern="1200"/>
+  </cs:valueAxis>
+  <cs:wall>
+    <cs:lnRef idx="0"/>
+    <cs:fillRef idx="0"/>
+    <cs:effectRef idx="0"/>
+    <cs:fontRef idx="minor">
+      <a:schemeClr val="tx1"/>
+    </cs:fontRef>
+    <cs:spPr>
+      <a:noFill/>
+      <a:ln>
+        <a:noFill/>
+      </a:ln>
+    </cs:spPr>
+  </cs:wall>
+</cs:chartStyle>
+</file>
+
+<file path=ppt/notesMasters/notesMaster1.xml><?xml version="1.0" encoding="utf-8"?>
+<p:notesMaster xmlns:a="http://schemas.openxmlformats.org/drawingml/2006/main" xmlns:r="http://schemas.openxmlformats.org/officeDocument/2006/relationships" xmlns:p="http://schemas.openxmlformats.org/presentationml/2006/main">
+  <p:cSld>
+    <p:bg>
+      <p:bgRef idx="1001">
+        <a:schemeClr val="bg1"/>
+      </p:bgRef>
+    </p:bg>
+    <p:spTree>
+      <p:nvGrpSpPr>
+        <p:cNvPr id="1" name=""/>
+        <p:cNvGrpSpPr/>
+        <p:nvPr/>
+      </p:nvGrpSpPr>
+      <p:grpSpPr>
+        <a:xfrm>
+          <a:off x="0" y="0"/>
+          <a:ext cx="0" cy="0"/>
+          <a:chOff x="0" y="0"/>
+          <a:chExt cx="0" cy="0"/>
+        </a:xfrm>
+      </p:grpSpPr>
+      <p:sp>
+        <p:nvSpPr>
+          <p:cNvPr id="2" name="Kopfzeilenplatzhalter 1"/>
+          <p:cNvSpPr>
+            <a:spLocks noGrp="1"/>
+          </p:cNvSpPr>
+          <p:nvPr>
+            <p:ph type="hdr" sz="quarter"/>
+          </p:nvPr>
+        </p:nvSpPr>
+        <p:spPr>
+          <a:xfrm>
+            <a:off x="0" y="0"/>
+            <a:ext cx="2971800" cy="458788"/>
+          </a:xfrm>
+          <a:prstGeom prst="rect">
+            <a:avLst/>
+          </a:prstGeom>
+        </p:spPr>
+        <p:txBody>
+          <a:bodyPr vert="horz" lIns="91440" tIns="45720" rIns="91440" bIns="45720" rtlCol="0"/>
+          <a:lstStyle>
+            <a:lvl1pPr algn="l">
+              <a:defRPr sz="1200"/>
+            </a:lvl1pPr>
+          </a:lstStyle>
+          <a:p>
+            <a:endParaRPr lang="de-DE"/>
+          </a:p>
+        </p:txBody>
+      </p:sp>
+      <p:sp>
+        <p:nvSpPr>
+          <p:cNvPr id="3" name="Datumsplatzhalter 2"/>
+          <p:cNvSpPr>
+            <a:spLocks noGrp="1"/>
+          </p:cNvSpPr>
+          <p:nvPr>
+            <p:ph type="dt" idx="1"/>
+          </p:nvPr>
+        </p:nvSpPr>
+        <p:spPr>
+          <a:xfrm>
+            <a:off x="3884613" y="0"/>
+            <a:ext cx="2971800" cy="458788"/>
+          </a:xfrm>
+          <a:prstGeom prst="rect">
+            <a:avLst/>
+          </a:prstGeom>
+        </p:spPr>
+        <p:txBody>
+          <a:bodyPr vert="horz" lIns="91440" tIns="45720" rIns="91440" bIns="45720" rtlCol="0"/>
+          <a:lstStyle>
+            <a:lvl1pPr algn="r">
+              <a:defRPr sz="1200"/>
+            </a:lvl1pPr>
+          </a:lstStyle>
+          <a:p>
+            <a:fld id="{F2BE2809-9CD3-44CB-AF6F-C524A9DCC3C4}" type="datetimeFigureOut">
+              <a:rPr lang="de-DE" smtClean="0"/>
+              <a:t>07.10.2024</a:t>
+            </a:fld>
+            <a:endParaRPr lang="de-DE"/>
+          </a:p>
+        </p:txBody>
+      </p:sp>
+      <p:sp>
+        <p:nvSpPr>
+          <p:cNvPr id="4" name="Folienbildplatzhalter 3"/>
+          <p:cNvSpPr>
+            <a:spLocks noGrp="1" noRot="1" noChangeAspect="1"/>
+          </p:cNvSpPr>
+          <p:nvPr>
+            <p:ph type="sldImg" idx="2"/>
+          </p:nvPr>
+        </p:nvSpPr>
+        <p:spPr>
+          <a:xfrm>
+            <a:off x="685800" y="1143000"/>
+            <a:ext cx="5486400" cy="3086100"/>
+          </a:xfrm>
+          <a:prstGeom prst="rect">
+            <a:avLst/>
+          </a:prstGeom>
+          <a:noFill/>
+          <a:ln w="12700">
+            <a:solidFill>
+              <a:prstClr val="black"/>
+            </a:solidFill>
+          </a:ln>
+        </p:spPr>
+        <p:txBody>
+          <a:bodyPr vert="horz" lIns="91440" tIns="45720" rIns="91440" bIns="45720" rtlCol="0" anchor="ctr"/>
+          <a:lstStyle/>
+          <a:p>
+            <a:endParaRPr lang="de-DE"/>
+          </a:p>
+        </p:txBody>
+      </p:sp>
+      <p:sp>
+        <p:nvSpPr>
+          <p:cNvPr id="5" name="Notizenplatzhalter 4"/>
+          <p:cNvSpPr>
+            <a:spLocks noGrp="1"/>
+          </p:cNvSpPr>
+          <p:nvPr>
+            <p:ph type="body" sz="quarter" idx="3"/>
+          </p:nvPr>
+        </p:nvSpPr>
+        <p:spPr>
+          <a:xfrm>
+            <a:off x="685800" y="4400550"/>
+            <a:ext cx="5486400" cy="3600450"/>
+          </a:xfrm>
+          <a:prstGeom prst="rect">
+            <a:avLst/>
+          </a:prstGeom>
+        </p:spPr>
+        <p:txBody>
+          <a:bodyPr vert="horz" lIns="91440" tIns="45720" rIns="91440" bIns="45720" rtlCol="0"/>
+          <a:lstStyle/>
+          <a:p>
+            <a:pPr lvl="0"/>
+            <a:r>
+              <a:rPr lang="de-DE"/>
+              <a:t>Mastertextformat bearbeiten</a:t>
+            </a:r>
+          </a:p>
+          <a:p>
+            <a:pPr lvl="1"/>
+            <a:r>
+              <a:rPr lang="de-DE"/>
+              <a:t>Zweite Ebene</a:t>
+            </a:r>
+          </a:p>
+          <a:p>
+            <a:pPr lvl="2"/>
+            <a:r>
+              <a:rPr lang="de-DE"/>
+              <a:t>Dritte Ebene</a:t>
+            </a:r>
+          </a:p>
+          <a:p>
+            <a:pPr lvl="3"/>
+            <a:r>
+              <a:rPr lang="de-DE"/>
+              <a:t>Vierte Ebene</a:t>
+            </a:r>
+          </a:p>
+          <a:p>
+            <a:pPr lvl="4"/>
+            <a:r>
+              <a:rPr lang="de-DE"/>
+              <a:t>Fünfte Ebene</a:t>
+            </a:r>
+          </a:p>
+        </p:txBody>
+      </p:sp>
+      <p:sp>
+        <p:nvSpPr>
+          <p:cNvPr id="6" name="Fußzeilenplatzhalter 5"/>
+          <p:cNvSpPr>
+            <a:spLocks noGrp="1"/>
+          </p:cNvSpPr>
+          <p:nvPr>
+            <p:ph type="ftr" sz="quarter" idx="4"/>
+          </p:nvPr>
+        </p:nvSpPr>
+        <p:spPr>
+          <a:xfrm>
+            <a:off x="0" y="8685213"/>
+            <a:ext cx="2971800" cy="458787"/>
+          </a:xfrm>
+          <a:prstGeom prst="rect">
+            <a:avLst/>
+          </a:prstGeom>
+        </p:spPr>
+        <p:txBody>
+          <a:bodyPr vert="horz" lIns="91440" tIns="45720" rIns="91440" bIns="45720" rtlCol="0" anchor="b"/>
+          <a:lstStyle>
+            <a:lvl1pPr algn="l">
+              <a:defRPr sz="1200"/>
+            </a:lvl1pPr>
+          </a:lstStyle>
+          <a:p>
+            <a:endParaRPr lang="de-DE"/>
+          </a:p>
+        </p:txBody>
+      </p:sp>
+      <p:sp>
+        <p:nvSpPr>
+          <p:cNvPr id="7" name="Foliennummernplatzhalter 6"/>
+          <p:cNvSpPr>
+            <a:spLocks noGrp="1"/>
+          </p:cNvSpPr>
+          <p:nvPr>
+            <p:ph type="sldNum" sz="quarter" idx="5"/>
+          </p:nvPr>
+        </p:nvSpPr>
+        <p:spPr>
+          <a:xfrm>
+            <a:off x="3884613" y="8685213"/>
+            <a:ext cx="2971800" cy="458787"/>
+          </a:xfrm>
+          <a:prstGeom prst="rect">
+            <a:avLst/>
+          </a:prstGeom>
+        </p:spPr>
+        <p:txBody>
+          <a:bodyPr vert="horz" lIns="91440" tIns="45720" rIns="91440" bIns="45720" rtlCol="0" anchor="b"/>
+          <a:lstStyle>
+            <a:lvl1pPr algn="r">
+              <a:defRPr sz="1200"/>
+            </a:lvl1pPr>
+          </a:lstStyle>
+          <a:p>
+            <a:fld id="{7BD232B7-C6EE-4981-B1CD-B35739CD10DB}" type="slidenum">
+              <a:rPr lang="de-DE" smtClean="0"/>
+              <a:t>‹Nr.›</a:t>
+            </a:fld>
+            <a:endParaRPr lang="de-DE"/>
+          </a:p>
+        </p:txBody>
+      </p:sp>
+    </p:spTree>
+    <p:extLst>
+      <p:ext uri="{BB962C8B-B14F-4D97-AF65-F5344CB8AC3E}">
+        <p14:creationId xmlns:p14="http://schemas.microsoft.com/office/powerpoint/2010/main" val="3801851493"/>
+      </p:ext>
+    </p:extLst>
+  </p:cSld>
+  <p:clrMap bg1="lt1" tx1="dk1" bg2="lt2" tx2="dk2" accent1="accent1" accent2="accent2" accent3="accent3" accent4="accent4" accent5="accent5" accent6="accent6" hlink="hlink" folHlink="folHlink"/>
+  <p:notesStyle>
+    <a:lvl1pPr marL="0" algn="l" defTabSz="914400" rtl="0" eaLnBrk="1" latinLnBrk="0" hangingPunct="1">
+      <a:defRPr sz="1200" kern="1200">
+        <a:solidFill>
+          <a:schemeClr val="tx1"/>
+        </a:solidFill>
+        <a:latin typeface="+mn-lt"/>
+        <a:ea typeface="+mn-ea"/>
+        <a:cs typeface="+mn-cs"/>
+      </a:defRPr>
+    </a:lvl1pPr>
+    <a:lvl2pPr marL="457200" algn="l" defTabSz="914400" rtl="0" eaLnBrk="1" latinLnBrk="0" hangingPunct="1">
+      <a:defRPr sz="1200" kern="1200">
+        <a:solidFill>
+          <a:schemeClr val="tx1"/>
+        </a:solidFill>
+        <a:latin typeface="+mn-lt"/>
+        <a:ea typeface="+mn-ea"/>
+        <a:cs typeface="+mn-cs"/>
+      </a:defRPr>
+    </a:lvl2pPr>
+    <a:lvl3pPr marL="914400" algn="l" defTabSz="914400" rtl="0" eaLnBrk="1" latinLnBrk="0" hangingPunct="1">
+      <a:defRPr sz="1200" kern="1200">
+        <a:solidFill>
+          <a:schemeClr val="tx1"/>
+        </a:solidFill>
+        <a:latin typeface="+mn-lt"/>
+        <a:ea typeface="+mn-ea"/>
+        <a:cs typeface="+mn-cs"/>
+      </a:defRPr>
+    </a:lvl3pPr>
+    <a:lvl4pPr marL="1371600" algn="l" defTabSz="914400" rtl="0" eaLnBrk="1" latinLnBrk="0" hangingPunct="1">
+      <a:defRPr sz="1200" kern="1200">
+        <a:solidFill>
+          <a:schemeClr val="tx1"/>
+        </a:solidFill>
+        <a:latin typeface="+mn-lt"/>
+        <a:ea typeface="+mn-ea"/>
+        <a:cs typeface="+mn-cs"/>
+      </a:defRPr>
+    </a:lvl4pPr>
+    <a:lvl5pPr marL="1828800" algn="l" defTabSz="914400" rtl="0" eaLnBrk="1" latinLnBrk="0" hangingPunct="1">
+      <a:defRPr sz="1200" kern="1200">
+        <a:solidFill>
+          <a:schemeClr val="tx1"/>
+        </a:solidFill>
+        <a:latin typeface="+mn-lt"/>
+        <a:ea typeface="+mn-ea"/>
+        <a:cs typeface="+mn-cs"/>
+      </a:defRPr>
+    </a:lvl5pPr>
+    <a:lvl6pPr marL="2286000" algn="l" defTabSz="914400" rtl="0" eaLnBrk="1" latinLnBrk="0" hangingPunct="1">
+      <a:defRPr sz="1200" kern="1200">
+        <a:solidFill>
+          <a:schemeClr val="tx1"/>
+        </a:solidFill>
+        <a:latin typeface="+mn-lt"/>
+        <a:ea typeface="+mn-ea"/>
+        <a:cs typeface="+mn-cs"/>
+      </a:defRPr>
+    </a:lvl6pPr>
+    <a:lvl7pPr marL="2743200" algn="l" defTabSz="914400" rtl="0" eaLnBrk="1" latinLnBrk="0" hangingPunct="1">
+      <a:defRPr sz="1200" kern="1200">
+        <a:solidFill>
+          <a:schemeClr val="tx1"/>
+        </a:solidFill>
+        <a:latin typeface="+mn-lt"/>
+        <a:ea typeface="+mn-ea"/>
+        <a:cs typeface="+mn-cs"/>
+      </a:defRPr>
+    </a:lvl7pPr>
+    <a:lvl8pPr marL="3200400" algn="l" defTabSz="914400" rtl="0" eaLnBrk="1" latinLnBrk="0" hangingPunct="1">
+      <a:defRPr sz="1200" kern="1200">
+        <a:solidFill>
+          <a:schemeClr val="tx1"/>
+        </a:solidFill>
+        <a:latin typeface="+mn-lt"/>
+        <a:ea typeface="+mn-ea"/>
+        <a:cs typeface="+mn-cs"/>
+      </a:defRPr>
+    </a:lvl8pPr>
+    <a:lvl9pPr marL="3657600" algn="l" defTabSz="914400" rtl="0" eaLnBrk="1" latinLnBrk="0" hangingPunct="1">
+      <a:defRPr sz="1200" kern="1200">
+        <a:solidFill>
+          <a:schemeClr val="tx1"/>
+        </a:solidFill>
+        <a:latin typeface="+mn-lt"/>
+        <a:ea typeface="+mn-ea"/>
+        <a:cs typeface="+mn-cs"/>
+      </a:defRPr>
+    </a:lvl9pPr>
+  </p:notesStyle>
+</p:notesMaster>
+</file>
+
+<file path=ppt/notesSlides/notesSlide1.xml><?xml version="1.0" encoding="utf-8"?>
+<p:notes xmlns:a="http://schemas.openxmlformats.org/drawingml/2006/main" xmlns:r="http://schemas.openxmlformats.org/officeDocument/2006/relationships" xmlns:p="http://schemas.openxmlformats.org/presentationml/2006/main">
+  <p:cSld>
+    <p:spTree>
+      <p:nvGrpSpPr>
+        <p:cNvPr id="1" name=""/>
+        <p:cNvGrpSpPr/>
+        <p:nvPr/>
+      </p:nvGrpSpPr>
+      <p:grpSpPr>
+        <a:xfrm>
+          <a:off x="0" y="0"/>
+          <a:ext cx="0" cy="0"/>
+          <a:chOff x="0" y="0"/>
+          <a:chExt cx="0" cy="0"/>
+        </a:xfrm>
+      </p:grpSpPr>
+      <p:sp>
+        <p:nvSpPr>
+          <p:cNvPr id="2" name="Folienbildplatzhalter 1"/>
+          <p:cNvSpPr>
+            <a:spLocks noGrp="1" noRot="1" noChangeAspect="1"/>
+          </p:cNvSpPr>
+          <p:nvPr>
+            <p:ph type="sldImg"/>
+          </p:nvPr>
+        </p:nvSpPr>
+        <p:spPr/>
+      </p:sp>
+      <p:sp>
+        <p:nvSpPr>
+          <p:cNvPr id="3" name="Notizenplatzhalter 2"/>
+          <p:cNvSpPr>
+            <a:spLocks noGrp="1"/>
+          </p:cNvSpPr>
+          <p:nvPr>
+            <p:ph type="body" idx="1"/>
+          </p:nvPr>
+        </p:nvSpPr>
+        <p:spPr/>
+        <p:txBody>
+          <a:bodyPr/>
+          <a:lstStyle/>
+          <a:p>
+            <a:endParaRPr lang="de-DE" dirty="0"/>
+          </a:p>
+        </p:txBody>
+      </p:sp>
+      <p:sp>
+        <p:nvSpPr>
+          <p:cNvPr id="4" name="Foliennummernplatzhalter 3"/>
+          <p:cNvSpPr>
+            <a:spLocks noGrp="1"/>
+          </p:cNvSpPr>
+          <p:nvPr>
+            <p:ph type="sldNum" sz="quarter" idx="5"/>
+          </p:nvPr>
+        </p:nvSpPr>
+        <p:spPr/>
+        <p:txBody>
+          <a:bodyPr/>
+          <a:lstStyle/>
+          <a:p>
+            <a:fld id="{7BD232B7-C6EE-4981-B1CD-B35739CD10DB}" type="slidenum">
+              <a:rPr lang="de-DE" smtClean="0"/>
+              <a:t>2</a:t>
+            </a:fld>
+            <a:endParaRPr lang="de-DE"/>
+          </a:p>
+        </p:txBody>
+      </p:sp>
+    </p:spTree>
+    <p:extLst>
+      <p:ext uri="{BB962C8B-B14F-4D97-AF65-F5344CB8AC3E}">
+        <p14:creationId xmlns:p14="http://schemas.microsoft.com/office/powerpoint/2010/main" val="903726732"/>
+      </p:ext>
+    </p:extLst>
+  </p:cSld>
+  <p:clrMapOvr>
+    <a:masterClrMapping/>
+  </p:clrMapOvr>
+</p:notes>
+</file>
+
 <file path=ppt/slideLayouts/slideLayout1.xml><?xml version="1.0" encoding="utf-8"?>
 <p:sldLayout xmlns:a="http://schemas.openxmlformats.org/drawingml/2006/main" xmlns:r="http://schemas.openxmlformats.org/officeDocument/2006/relationships" xmlns:p="http://schemas.openxmlformats.org/presentationml/2006/main" type="title" preserve="1">
   <p:cSld name="Titelfolie">
@@ -1115,7 +2523,7 @@
           <a:p>
             <a:fld id="{00219EEC-8365-4023-B333-35C696E1BD8E}" type="datetimeFigureOut">
               <a:rPr lang="de-AT" smtClean="0"/>
-              <a:t>13.06.2024</a:t>
+              <a:t>07.10.2024</a:t>
             </a:fld>
             <a:endParaRPr lang="de-AT"/>
           </a:p>
@@ -1315,7 +2723,7 @@
           <a:p>
             <a:fld id="{00219EEC-8365-4023-B333-35C696E1BD8E}" type="datetimeFigureOut">
               <a:rPr lang="de-AT" smtClean="0"/>
-              <a:t>13.06.2024</a:t>
+              <a:t>07.10.2024</a:t>
             </a:fld>
             <a:endParaRPr lang="de-AT"/>
           </a:p>
@@ -1525,7 +2933,7 @@
           <a:p>
             <a:fld id="{00219EEC-8365-4023-B333-35C696E1BD8E}" type="datetimeFigureOut">
               <a:rPr lang="de-AT" smtClean="0"/>
-              <a:t>13.06.2024</a:t>
+              <a:t>07.10.2024</a:t>
             </a:fld>
             <a:endParaRPr lang="de-AT"/>
           </a:p>
@@ -1725,7 +3133,7 @@
           <a:p>
             <a:fld id="{00219EEC-8365-4023-B333-35C696E1BD8E}" type="datetimeFigureOut">
               <a:rPr lang="de-AT" smtClean="0"/>
-              <a:t>13.06.2024</a:t>
+              <a:t>07.10.2024</a:t>
             </a:fld>
             <a:endParaRPr lang="de-AT"/>
           </a:p>
@@ -2001,7 +3409,7 @@
           <a:p>
             <a:fld id="{00219EEC-8365-4023-B333-35C696E1BD8E}" type="datetimeFigureOut">
               <a:rPr lang="de-AT" smtClean="0"/>
-              <a:t>13.06.2024</a:t>
+              <a:t>07.10.2024</a:t>
             </a:fld>
             <a:endParaRPr lang="de-AT"/>
           </a:p>
@@ -2269,7 +3677,7 @@
           <a:p>
             <a:fld id="{00219EEC-8365-4023-B333-35C696E1BD8E}" type="datetimeFigureOut">
               <a:rPr lang="de-AT" smtClean="0"/>
-              <a:t>13.06.2024</a:t>
+              <a:t>07.10.2024</a:t>
             </a:fld>
             <a:endParaRPr lang="de-AT"/>
           </a:p>
@@ -2684,7 +4092,7 @@
           <a:p>
             <a:fld id="{00219EEC-8365-4023-B333-35C696E1BD8E}" type="datetimeFigureOut">
               <a:rPr lang="de-AT" smtClean="0"/>
-              <a:t>13.06.2024</a:t>
+              <a:t>07.10.2024</a:t>
             </a:fld>
             <a:endParaRPr lang="de-AT"/>
           </a:p>
@@ -2826,7 +4234,7 @@
           <a:p>
             <a:fld id="{00219EEC-8365-4023-B333-35C696E1BD8E}" type="datetimeFigureOut">
               <a:rPr lang="de-AT" smtClean="0"/>
-              <a:t>13.06.2024</a:t>
+              <a:t>07.10.2024</a:t>
             </a:fld>
             <a:endParaRPr lang="de-AT"/>
           </a:p>
@@ -2939,7 +4347,7 @@
           <a:p>
             <a:fld id="{00219EEC-8365-4023-B333-35C696E1BD8E}" type="datetimeFigureOut">
               <a:rPr lang="de-AT" smtClean="0"/>
-              <a:t>13.06.2024</a:t>
+              <a:t>07.10.2024</a:t>
             </a:fld>
             <a:endParaRPr lang="de-AT"/>
           </a:p>
@@ -3252,7 +4660,7 @@
           <a:p>
             <a:fld id="{00219EEC-8365-4023-B333-35C696E1BD8E}" type="datetimeFigureOut">
               <a:rPr lang="de-AT" smtClean="0"/>
-              <a:t>13.06.2024</a:t>
+              <a:t>07.10.2024</a:t>
             </a:fld>
             <a:endParaRPr lang="de-AT"/>
           </a:p>
@@ -3541,7 +4949,7 @@
           <a:p>
             <a:fld id="{00219EEC-8365-4023-B333-35C696E1BD8E}" type="datetimeFigureOut">
               <a:rPr lang="de-AT" smtClean="0"/>
-              <a:t>13.06.2024</a:t>
+              <a:t>07.10.2024</a:t>
             </a:fld>
             <a:endParaRPr lang="de-AT"/>
           </a:p>
@@ -3784,7 +5192,7 @@
           <a:p>
             <a:fld id="{00219EEC-8365-4023-B333-35C696E1BD8E}" type="datetimeFigureOut">
               <a:rPr lang="de-AT" smtClean="0"/>
-              <a:t>13.06.2024</a:t>
+              <a:t>07.10.2024</a:t>
             </a:fld>
             <a:endParaRPr lang="de-AT"/>
           </a:p>
@@ -4634,7 +6042,7 @@
           <p:nvPr>
             <p:extLst>
               <p:ext uri="{D42A27DB-BD31-4B8C-83A1-F6EECF244321}">
-                <p14:modId xmlns:p14="http://schemas.microsoft.com/office/powerpoint/2010/main" val="1124953577"/>
+                <p14:modId xmlns:p14="http://schemas.microsoft.com/office/powerpoint/2010/main" val="2642262685"/>
               </p:ext>
             </p:extLst>
           </p:nvPr>
@@ -4642,6 +6050,67 @@
         <p:xfrm>
           <a:off x="2032000" y="719666"/>
           <a:ext cx="8128000" cy="5418667"/>
+        </p:xfrm>
+        <a:graphic>
+          <a:graphicData uri="http://schemas.openxmlformats.org/drawingml/2006/chart">
+            <c:chart xmlns:c="http://schemas.openxmlformats.org/drawingml/2006/chart" xmlns:r="http://schemas.openxmlformats.org/officeDocument/2006/relationships" r:id="rId3"/>
+          </a:graphicData>
+        </a:graphic>
+      </p:graphicFrame>
+    </p:spTree>
+    <p:extLst>
+      <p:ext uri="{BB962C8B-B14F-4D97-AF65-F5344CB8AC3E}">
+        <p14:creationId xmlns:p14="http://schemas.microsoft.com/office/powerpoint/2010/main" val="2727616202"/>
+      </p:ext>
+    </p:extLst>
+  </p:cSld>
+  <p:clrMapOvr>
+    <a:masterClrMapping/>
+  </p:clrMapOvr>
+</p:sld>
+</file>
+
+<file path=ppt/slides/slide3.xml><?xml version="1.0" encoding="utf-8"?>
+<p:sld xmlns:a="http://schemas.openxmlformats.org/drawingml/2006/main" xmlns:r="http://schemas.openxmlformats.org/officeDocument/2006/relationships" xmlns:p="http://schemas.openxmlformats.org/presentationml/2006/main">
+  <p:cSld>
+    <p:spTree>
+      <p:nvGrpSpPr>
+        <p:cNvPr id="1" name=""/>
+        <p:cNvGrpSpPr/>
+        <p:nvPr/>
+      </p:nvGrpSpPr>
+      <p:grpSpPr>
+        <a:xfrm>
+          <a:off x="0" y="0"/>
+          <a:ext cx="0" cy="0"/>
+          <a:chOff x="0" y="0"/>
+          <a:chExt cx="0" cy="0"/>
+        </a:xfrm>
+      </p:grpSpPr>
+      <p:graphicFrame>
+        <p:nvGraphicFramePr>
+          <p:cNvPr id="11" name="LineChart">
+            <a:extLst>
+              <a:ext uri="{FF2B5EF4-FFF2-40B4-BE49-F238E27FC236}">
+                <a16:creationId xmlns:a16="http://schemas.microsoft.com/office/drawing/2014/main" id="{2741C1F7-D5BC-C6F1-745B-8ACFA3B44A4A}"/>
+              </a:ext>
+            </a:extLst>
+          </p:cNvPr>
+          <p:cNvGraphicFramePr>
+            <a:graphicFrameLocks noGrp="1"/>
+          </p:cNvGraphicFramePr>
+          <p:nvPr>
+            <p:ph idx="1"/>
+            <p:extLst>
+              <p:ext uri="{D42A27DB-BD31-4B8C-83A1-F6EECF244321}">
+                <p14:modId xmlns:p14="http://schemas.microsoft.com/office/powerpoint/2010/main" val="496978390"/>
+              </p:ext>
+            </p:extLst>
+          </p:nvPr>
+        </p:nvGraphicFramePr>
+        <p:xfrm>
+          <a:off x="838200" y="1825625"/>
+          <a:ext cx="10515600" cy="4351338"/>
         </p:xfrm>
         <a:graphic>
           <a:graphicData uri="http://schemas.openxmlformats.org/drawingml/2006/chart">
@@ -4652,7 +6121,7 @@
     </p:spTree>
     <p:extLst>
       <p:ext uri="{BB962C8B-B14F-4D97-AF65-F5344CB8AC3E}">
-        <p14:creationId xmlns:p14="http://schemas.microsoft.com/office/powerpoint/2010/main" val="2727616202"/>
+        <p14:creationId xmlns:p14="http://schemas.microsoft.com/office/powerpoint/2010/main" val="2999535791"/>
       </p:ext>
     </p:extLst>
   </p:cSld>
@@ -4975,4 +6444,319 @@
     </a:ext>
   </a:extLst>
 </a:theme>
+</file>
+
+<file path=ppt/theme/theme2.xml><?xml version="1.0" encoding="utf-8"?>
+<a:theme xmlns:a="http://schemas.openxmlformats.org/drawingml/2006/main" name="Office">
+  <a:themeElements>
+    <a:clrScheme name="Office">
+      <a:dk1>
+        <a:sysClr val="windowText" lastClr="000000"/>
+      </a:dk1>
+      <a:lt1>
+        <a:sysClr val="window" lastClr="FFFFFF"/>
+      </a:lt1>
+      <a:dk2>
+        <a:srgbClr val="0E2841"/>
+      </a:dk2>
+      <a:lt2>
+        <a:srgbClr val="E8E8E8"/>
+      </a:lt2>
+      <a:accent1>
+        <a:srgbClr val="156082"/>
+      </a:accent1>
+      <a:accent2>
+        <a:srgbClr val="E97132"/>
+      </a:accent2>
+      <a:accent3>
+        <a:srgbClr val="196B24"/>
+      </a:accent3>
+      <a:accent4>
+        <a:srgbClr val="0F9ED5"/>
+      </a:accent4>
+      <a:accent5>
+        <a:srgbClr val="A02B93"/>
+      </a:accent5>
+      <a:accent6>
+        <a:srgbClr val="4EA72E"/>
+      </a:accent6>
+      <a:hlink>
+        <a:srgbClr val="467886"/>
+      </a:hlink>
+      <a:folHlink>
+        <a:srgbClr val="96607D"/>
+      </a:folHlink>
+    </a:clrScheme>
+    <a:fontScheme name="Office">
+      <a:majorFont>
+        <a:latin typeface="Aptos Display" panose="02110004020202020204"/>
+        <a:ea typeface=""/>
+        <a:cs typeface=""/>
+        <a:font script="Jpan" typeface="游ゴシック Light"/>
+        <a:font script="Hang" typeface="맑은 고딕"/>
+        <a:font script="Hans" typeface="等线 Light"/>
+        <a:font script="Hant" typeface="新細明體"/>
+        <a:font script="Arab" typeface="Times New Roman"/>
+        <a:font script="Hebr" typeface="Times New Roman"/>
+        <a:font script="Thai" typeface="Angsana New"/>
+        <a:font script="Ethi" typeface="Nyala"/>
+        <a:font script="Beng" typeface="Vrinda"/>
+        <a:font script="Gujr" typeface="Shruti"/>
+        <a:font script="Khmr" typeface="MoolBoran"/>
+        <a:font script="Knda" typeface="Tunga"/>
+        <a:font script="Guru" typeface="Raavi"/>
+        <a:font script="Cans" typeface="Euphemia"/>
+        <a:font script="Cher" typeface="Plantagenet Cherokee"/>
+        <a:font script="Yiii" typeface="Microsoft Yi Baiti"/>
+        <a:font script="Tibt" typeface="Microsoft Himalaya"/>
+        <a:font script="Thaa" typeface="MV Boli"/>
+        <a:font script="Deva" typeface="Mangal"/>
+        <a:font script="Telu" typeface="Gautami"/>
+        <a:font script="Taml" typeface="Latha"/>
+        <a:font script="Syrc" typeface="Estrangelo Edessa"/>
+        <a:font script="Orya" typeface="Kalinga"/>
+        <a:font script="Mlym" typeface="Kartika"/>
+        <a:font script="Laoo" typeface="DokChampa"/>
+        <a:font script="Sinh" typeface="Iskoola Pota"/>
+        <a:font script="Mong" typeface="Mongolian Baiti"/>
+        <a:font script="Viet" typeface="Times New Roman"/>
+        <a:font script="Uigh" typeface="Microsoft Uighur"/>
+        <a:font script="Geor" typeface="Sylfaen"/>
+        <a:font script="Armn" typeface="Arial"/>
+        <a:font script="Bugi" typeface="Leelawadee UI"/>
+        <a:font script="Bopo" typeface="Microsoft JhengHei"/>
+        <a:font script="Java" typeface="Javanese Text"/>
+        <a:font script="Lisu" typeface="Segoe UI"/>
+        <a:font script="Mymr" typeface="Myanmar Text"/>
+        <a:font script="Nkoo" typeface="Ebrima"/>
+        <a:font script="Olck" typeface="Nirmala UI"/>
+        <a:font script="Osma" typeface="Ebrima"/>
+        <a:font script="Phag" typeface="Phagspa"/>
+        <a:font script="Syrn" typeface="Estrangelo Edessa"/>
+        <a:font script="Syrj" typeface="Estrangelo Edessa"/>
+        <a:font script="Syre" typeface="Estrangelo Edessa"/>
+        <a:font script="Sora" typeface="Nirmala UI"/>
+        <a:font script="Tale" typeface="Microsoft Tai Le"/>
+        <a:font script="Talu" typeface="Microsoft New Tai Lue"/>
+        <a:font script="Tfng" typeface="Ebrima"/>
+      </a:majorFont>
+      <a:minorFont>
+        <a:latin typeface="Aptos" panose="02110004020202020204"/>
+        <a:ea typeface=""/>
+        <a:cs typeface=""/>
+        <a:font script="Jpan" typeface="游ゴシック"/>
+        <a:font script="Hang" typeface="맑은 고딕"/>
+        <a:font script="Hans" typeface="等线"/>
+        <a:font script="Hant" typeface="新細明體"/>
+        <a:font script="Arab" typeface="Arial"/>
+        <a:font script="Hebr" typeface="Arial"/>
+        <a:font script="Thai" typeface="Cordia New"/>
+        <a:font script="Ethi" typeface="Nyala"/>
+        <a:font script="Beng" typeface="Vrinda"/>
+        <a:font script="Gujr" typeface="Shruti"/>
+        <a:font script="Khmr" typeface="DaunPenh"/>
+        <a:font script="Knda" typeface="Tunga"/>
+        <a:font script="Guru" typeface="Raavi"/>
+        <a:font script="Cans" typeface="Euphemia"/>
+        <a:font script="Cher" typeface="Plantagenet Cherokee"/>
+        <a:font script="Yiii" typeface="Microsoft Yi Baiti"/>
+        <a:font script="Tibt" typeface="Microsoft Himalaya"/>
+        <a:font script="Thaa" typeface="MV Boli"/>
+        <a:font script="Deva" typeface="Mangal"/>
+        <a:font script="Telu" typeface="Gautami"/>
+        <a:font script="Taml" typeface="Latha"/>
+        <a:font script="Syrc" typeface="Estrangelo Edessa"/>
+        <a:font script="Orya" typeface="Kalinga"/>
+        <a:font script="Mlym" typeface="Kartika"/>
+        <a:font script="Laoo" typeface="DokChampa"/>
+        <a:font script="Sinh" typeface="Iskoola Pota"/>
+        <a:font script="Mong" typeface="Mongolian Baiti"/>
+        <a:font script="Viet" typeface="Arial"/>
+        <a:font script="Uigh" typeface="Microsoft Uighur"/>
+        <a:font script="Geor" typeface="Sylfaen"/>
+        <a:font script="Armn" typeface="Arial"/>
+        <a:font script="Bugi" typeface="Leelawadee UI"/>
+        <a:font script="Bopo" typeface="Microsoft JhengHei"/>
+        <a:font script="Java" typeface="Javanese Text"/>
+        <a:font script="Lisu" typeface="Segoe UI"/>
+        <a:font script="Mymr" typeface="Myanmar Text"/>
+        <a:font script="Nkoo" typeface="Ebrima"/>
+        <a:font script="Olck" typeface="Nirmala UI"/>
+        <a:font script="Osma" typeface="Ebrima"/>
+        <a:font script="Phag" typeface="Phagspa"/>
+        <a:font script="Syrn" typeface="Estrangelo Edessa"/>
+        <a:font script="Syrj" typeface="Estrangelo Edessa"/>
+        <a:font script="Syre" typeface="Estrangelo Edessa"/>
+        <a:font script="Sora" typeface="Nirmala UI"/>
+        <a:font script="Tale" typeface="Microsoft Tai Le"/>
+        <a:font script="Talu" typeface="Microsoft New Tai Lue"/>
+        <a:font script="Tfng" typeface="Ebrima"/>
+      </a:minorFont>
+    </a:fontScheme>
+    <a:fmtScheme name="Office">
+      <a:fillStyleLst>
+        <a:solidFill>
+          <a:schemeClr val="phClr"/>
+        </a:solidFill>
+        <a:gradFill rotWithShape="1">
+          <a:gsLst>
+            <a:gs pos="0">
+              <a:schemeClr val="phClr">
+                <a:lumMod val="110000"/>
+                <a:satMod val="105000"/>
+                <a:tint val="67000"/>
+              </a:schemeClr>
+            </a:gs>
+            <a:gs pos="50000">
+              <a:schemeClr val="phClr">
+                <a:lumMod val="105000"/>
+                <a:satMod val="103000"/>
+                <a:tint val="73000"/>
+              </a:schemeClr>
+            </a:gs>
+            <a:gs pos="100000">
+              <a:schemeClr val="phClr">
+                <a:lumMod val="105000"/>
+                <a:satMod val="109000"/>
+                <a:tint val="81000"/>
+              </a:schemeClr>
+            </a:gs>
+          </a:gsLst>
+          <a:lin ang="5400000" scaled="0"/>
+        </a:gradFill>
+        <a:gradFill rotWithShape="1">
+          <a:gsLst>
+            <a:gs pos="0">
+              <a:schemeClr val="phClr">
+                <a:satMod val="103000"/>
+                <a:lumMod val="102000"/>
+                <a:tint val="94000"/>
+              </a:schemeClr>
+            </a:gs>
+            <a:gs pos="50000">
+              <a:schemeClr val="phClr">
+                <a:satMod val="110000"/>
+                <a:lumMod val="100000"/>
+                <a:shade val="100000"/>
+              </a:schemeClr>
+            </a:gs>
+            <a:gs pos="100000">
+              <a:schemeClr val="phClr">
+                <a:lumMod val="99000"/>
+                <a:satMod val="120000"/>
+                <a:shade val="78000"/>
+              </a:schemeClr>
+            </a:gs>
+          </a:gsLst>
+          <a:lin ang="5400000" scaled="0"/>
+        </a:gradFill>
+      </a:fillStyleLst>
+      <a:lnStyleLst>
+        <a:ln w="12700" cap="flat" cmpd="sng" algn="ctr">
+          <a:solidFill>
+            <a:schemeClr val="phClr"/>
+          </a:solidFill>
+          <a:prstDash val="solid"/>
+          <a:miter lim="800000"/>
+        </a:ln>
+        <a:ln w="19050" cap="flat" cmpd="sng" algn="ctr">
+          <a:solidFill>
+            <a:schemeClr val="phClr"/>
+          </a:solidFill>
+          <a:prstDash val="solid"/>
+          <a:miter lim="800000"/>
+        </a:ln>
+        <a:ln w="25400" cap="flat" cmpd="sng" algn="ctr">
+          <a:solidFill>
+            <a:schemeClr val="phClr"/>
+          </a:solidFill>
+          <a:prstDash val="solid"/>
+          <a:miter lim="800000"/>
+        </a:ln>
+      </a:lnStyleLst>
+      <a:effectStyleLst>
+        <a:effectStyle>
+          <a:effectLst/>
+        </a:effectStyle>
+        <a:effectStyle>
+          <a:effectLst/>
+        </a:effectStyle>
+        <a:effectStyle>
+          <a:effectLst>
+            <a:outerShdw blurRad="57150" dist="19050" dir="5400000" algn="ctr" rotWithShape="0">
+              <a:srgbClr val="000000">
+                <a:alpha val="63000"/>
+              </a:srgbClr>
+            </a:outerShdw>
+          </a:effectLst>
+        </a:effectStyle>
+      </a:effectStyleLst>
+      <a:bgFillStyleLst>
+        <a:solidFill>
+          <a:schemeClr val="phClr"/>
+        </a:solidFill>
+        <a:solidFill>
+          <a:schemeClr val="phClr">
+            <a:tint val="95000"/>
+            <a:satMod val="170000"/>
+          </a:schemeClr>
+        </a:solidFill>
+        <a:gradFill rotWithShape="1">
+          <a:gsLst>
+            <a:gs pos="0">
+              <a:schemeClr val="phClr">
+                <a:tint val="93000"/>
+                <a:satMod val="150000"/>
+                <a:shade val="98000"/>
+                <a:lumMod val="102000"/>
+              </a:schemeClr>
+            </a:gs>
+            <a:gs pos="50000">
+              <a:schemeClr val="phClr">
+                <a:tint val="98000"/>
+                <a:satMod val="130000"/>
+                <a:shade val="90000"/>
+                <a:lumMod val="103000"/>
+              </a:schemeClr>
+            </a:gs>
+            <a:gs pos="100000">
+              <a:schemeClr val="phClr">
+                <a:shade val="63000"/>
+                <a:satMod val="120000"/>
+              </a:schemeClr>
+            </a:gs>
+          </a:gsLst>
+          <a:lin ang="5400000" scaled="0"/>
+        </a:gradFill>
+      </a:bgFillStyleLst>
+    </a:fmtScheme>
+  </a:themeElements>
+  <a:objectDefaults>
+    <a:lnDef>
+      <a:spPr/>
+      <a:bodyPr/>
+      <a:lstStyle/>
+      <a:style>
+        <a:lnRef idx="2">
+          <a:schemeClr val="accent1"/>
+        </a:lnRef>
+        <a:fillRef idx="0">
+          <a:schemeClr val="accent1"/>
+        </a:fillRef>
+        <a:effectRef idx="1">
+          <a:schemeClr val="accent1"/>
+        </a:effectRef>
+        <a:fontRef idx="minor">
+          <a:schemeClr val="tx1"/>
+        </a:fontRef>
+      </a:style>
+    </a:lnDef>
+  </a:objectDefaults>
+  <a:extraClrSchemeLst/>
+  <a:extLst>
+    <a:ext uri="{05A4C25C-085E-4340-85A3-A5531E510DB2}">
+      <thm15:themeFamily xmlns:thm15="http://schemas.microsoft.com/office/thememl/2012/main" name="Office Theme" id="{2E142A2C-CD16-42D6-873A-C26D2A0506FA}" vid="{1BDDFF52-6CD6-40A5-AB3C-68EB2F1E4D0A}"/>
+    </a:ext>
+  </a:extLst>
+</a:theme>
 </file>
</xml_diff>